<commit_message>
Courbes finales dans excel
</commit_message>
<xml_diff>
--- a/Redaction/Presentation/pres.pptx
+++ b/Redaction/Presentation/pres.pptx
@@ -31004,10 +31004,7 @@
             <a:r>
               <a:rPr lang="fr-FR" dirty="0" err="1">
                 <a:solidFill>
-                  <a:schemeClr val="tx1">
-                    <a:lumMod val="75000"/>
-                    <a:lumOff val="25000"/>
-                  </a:schemeClr>
+                  <a:srgbClr val="000000"/>
                 </a:solidFill>
               </a:rPr>
               <a:t>LMST</a:t>
@@ -31015,10 +31012,7 @@
             <a:r>
               <a:rPr lang="fr-FR" dirty="0">
                 <a:solidFill>
-                  <a:schemeClr val="tx1">
-                    <a:lumMod val="75000"/>
-                    <a:lumOff val="25000"/>
-                  </a:schemeClr>
+                  <a:srgbClr val="000000"/>
                 </a:solidFill>
               </a:rPr>
               <a:t> Broadcast Oriented Protocol (LBOP)</a:t>
@@ -31028,10 +31022,7 @@
             <a:r>
               <a:rPr lang="fr-FR" dirty="0" err="1">
                 <a:solidFill>
-                  <a:schemeClr val="tx1">
-                    <a:lumMod val="75000"/>
-                    <a:lumOff val="25000"/>
-                  </a:schemeClr>
+                  <a:srgbClr val="000000"/>
                 </a:solidFill>
               </a:rPr>
               <a:t>RNG</a:t>
@@ -31039,10 +31030,7 @@
             <a:r>
               <a:rPr lang="fr-FR" dirty="0">
                 <a:solidFill>
-                  <a:schemeClr val="tx1">
-                    <a:lumMod val="75000"/>
-                    <a:lumOff val="25000"/>
-                  </a:schemeClr>
+                  <a:srgbClr val="000000"/>
                 </a:solidFill>
               </a:rPr>
               <a:t> Broadcast Oriented Protocol (RBOP)</a:t>
@@ -31052,10 +31040,7 @@
             <a:r>
               <a:rPr lang="fr-FR" dirty="0">
                 <a:solidFill>
-                  <a:schemeClr val="tx1">
-                    <a:lumMod val="75000"/>
-                    <a:lumOff val="25000"/>
-                  </a:schemeClr>
+                  <a:srgbClr val="000000"/>
                 </a:solidFill>
               </a:rPr>
               <a:t>Phases d’initialisation : arbres couvrants</a:t>
@@ -31066,10 +31051,7 @@
             <a:r>
               <a:rPr lang="fr-FR" dirty="0">
                 <a:solidFill>
-                  <a:schemeClr val="tx1">
-                    <a:lumMod val="75000"/>
-                    <a:lumOff val="25000"/>
-                  </a:schemeClr>
+                  <a:srgbClr val="000000"/>
                 </a:solidFill>
               </a:rPr>
               <a:t>Local Minimal Spanning Tree</a:t>
@@ -31078,7 +31060,11 @@
           <a:p>
             <a:pPr lvl="1"/>
             <a:r>
-              <a:rPr lang="fr-FR"/>
+              <a:rPr lang="fr-FR">
+                <a:solidFill>
+                  <a:srgbClr val="000000"/>
+                </a:solidFill>
+              </a:rPr>
               <a:t>Relative Neighborhood Graph</a:t>
             </a:r>
           </a:p>

</xml_diff>